<commit_message>
domain report fs 근태 테이블 수정
</commit_message>
<xml_diff>
--- a/report/fs/FS_ESS.근태관리프로젝트_부서관리.pptx
+++ b/report/fs/FS_ESS.근태관리프로젝트_부서관리.pptx
@@ -297,7 +297,7 @@
               <a:pPr>
                 <a:defRPr/>
               </a:pPr>
-              <a:t>2025-05-20</a:t>
+              <a:t>2025-05-23</a:t>
             </a:fld>
             <a:endParaRPr lang="ko-KR" altLang="en-US" dirty="0"/>
           </a:p>
@@ -504,7 +504,7 @@
               <a:pPr>
                 <a:defRPr/>
               </a:pPr>
-              <a:t>2025-05-20</a:t>
+              <a:t>2025-05-23</a:t>
             </a:fld>
             <a:endParaRPr lang="ko-KR" altLang="en-US" dirty="0"/>
           </a:p>
@@ -2060,7 +2060,7 @@
               <a:pPr>
                 <a:defRPr/>
               </a:pPr>
-              <a:t>2025-05-20</a:t>
+              <a:t>2025-05-23</a:t>
             </a:fld>
             <a:endParaRPr lang="ko-KR" altLang="en-US" dirty="0"/>
           </a:p>
@@ -12505,7 +12505,7 @@
           <p:nvPr>
             <p:extLst>
               <p:ext uri="{D42A27DB-BD31-4B8C-83A1-F6EECF244321}">
-                <p14:modId xmlns:p14="http://schemas.microsoft.com/office/powerpoint/2010/main" val="2479611531"/>
+                <p14:modId xmlns:p14="http://schemas.microsoft.com/office/powerpoint/2010/main" val="1864161745"/>
               </p:ext>
             </p:extLst>
           </p:nvPr>
@@ -12564,7 +12564,7 @@
                         <a:tabLst/>
                       </a:pPr>
                       <a:r>
-                        <a:rPr kumimoji="1" lang="ko-KR" altLang="en-US" sz="1200" b="0" i="0" u="none" strike="noStrike" cap="none" normalizeH="0" baseline="0" dirty="0">
+                        <a:rPr kumimoji="1" lang="ko-KR" altLang="en-US" sz="1200" b="0" i="0" u="none" strike="noStrike" cap="none" normalizeH="0" baseline="0">
                           <a:ln>
                             <a:noFill/>
                           </a:ln>
@@ -12577,6 +12577,17 @@
                         </a:rPr>
                         <a:t>로직 명</a:t>
                       </a:r>
+                      <a:endParaRPr kumimoji="1" lang="ko-KR" altLang="en-US" sz="1200" b="0" i="0" u="none" strike="noStrike" cap="none" normalizeH="0" baseline="0" dirty="0">
+                        <a:ln>
+                          <a:noFill/>
+                        </a:ln>
+                        <a:solidFill>
+                          <a:srgbClr val="000000"/>
+                        </a:solidFill>
+                        <a:effectLst/>
+                        <a:latin typeface="맑은 고딕" panose="020B0503020000020004" pitchFamily="50" charset="-127"/>
+                        <a:ea typeface="맑은 고딕" panose="020B0503020000020004" pitchFamily="50" charset="-127"/>
+                      </a:endParaRPr>
                     </a:p>
                   </a:txBody>
                   <a:tcPr marL="36000" marR="36000" marT="18000" marB="18000" anchor="ctr" horzOverflow="overflow">
@@ -12835,11 +12846,14 @@
                     <a:p>
                       <a:pPr fontAlgn="base" latinLnBrk="0"/>
                       <a:r>
-                        <a:rPr lang="ko-KR" altLang="en-US" sz="1100" dirty="0">
+                        <a:rPr lang="ko-KR" altLang="en-US" sz="1100">
                           <a:effectLst/>
                         </a:rPr>
                         <a:t>부서목록조회</a:t>
                       </a:r>
+                      <a:endParaRPr lang="ko-KR" altLang="en-US" sz="1100" dirty="0">
+                        <a:effectLst/>
+                      </a:endParaRPr>
                     </a:p>
                   </a:txBody>
                   <a:tcPr marL="76200" marR="76200" anchor="ctr">
@@ -12903,34 +12917,61 @@
                     <a:bodyPr/>
                     <a:lstStyle/>
                     <a:p>
-                      <a:pPr fontAlgn="base" latinLnBrk="0"/>
-                      <a:r>
-                        <a:rPr lang="en-US" altLang="ko-KR" sz="1100" dirty="0">
-                          <a:effectLst/>
-                        </a:rPr>
+                      <a:r>
+                        <a:rPr lang="en-US" altLang="ko-KR" sz="1100" dirty="0"/>
                         <a:t>ORGDEPTMASTER </a:t>
                       </a:r>
                       <a:r>
-                        <a:rPr lang="ko-KR" altLang="en-US" sz="1100" dirty="0">
-                          <a:effectLst/>
-                        </a:rPr>
-                        <a:t>테이블 조회 </a:t>
-                      </a:r>
-                      <a:r>
-                        <a:rPr lang="en-US" altLang="ko-KR" sz="1100" dirty="0">
-                          <a:effectLst/>
-                        </a:rPr>
-                        <a:t>+ HRIMASTER JOIN</a:t>
-                      </a:r>
-                      <a:r>
-                        <a:rPr lang="ko-KR" altLang="en-US" sz="1100" dirty="0">
-                          <a:effectLst/>
-                        </a:rPr>
-                        <a:t>으로 소속 인원수 계산</a:t>
+                        <a:rPr lang="ko-KR" altLang="en-US" sz="1100" dirty="0"/>
+                        <a:t>테이블에서 전체 부서 목록을 조회</a:t>
+                      </a:r>
+                      <a:r>
+                        <a:rPr lang="en-US" altLang="ko-KR" sz="1100" dirty="0"/>
+                        <a:t>.</a:t>
+                      </a:r>
+                    </a:p>
+                    <a:p>
+                      <a:r>
+                        <a:rPr lang="en-US" altLang="ko-KR" sz="1100" dirty="0"/>
+                        <a:t>HRIMASTER </a:t>
+                      </a:r>
+                      <a:r>
+                        <a:rPr lang="ko-KR" altLang="en-US" sz="1100" dirty="0"/>
+                        <a:t>조인으로 부서장의 이름</a:t>
+                      </a:r>
+                      <a:r>
+                        <a:rPr lang="en-US" altLang="ko-KR" sz="1100" dirty="0"/>
+                        <a:t>(EMP_NAME)</a:t>
+                      </a:r>
+                      <a:r>
+                        <a:rPr lang="ko-KR" altLang="en-US" sz="1100" dirty="0"/>
+                        <a:t>과 부서 인원 수</a:t>
+                      </a:r>
+                      <a:r>
+                        <a:rPr lang="en-US" altLang="ko-KR" sz="1100" dirty="0"/>
+                        <a:t>(COUNT) </a:t>
+                      </a:r>
+                      <a:r>
+                        <a:rPr lang="ko-KR" altLang="en-US" sz="1100" dirty="0"/>
+                        <a:t>포함</a:t>
+                      </a:r>
+                      <a:endParaRPr lang="en-US" altLang="ko-KR" sz="1100" dirty="0"/>
+                    </a:p>
+                    <a:p>
+                      <a:endParaRPr lang="en-US" altLang="ko-KR" sz="1100" dirty="0"/>
+                    </a:p>
+                    <a:p>
+                      <a:r>
+                        <a:rPr lang="en-US" altLang="ko-KR" sz="1100" dirty="0"/>
+                        <a:t>DEPT_CODE </a:t>
+                      </a:r>
+                      <a:r>
+                        <a:rPr lang="ko-KR" altLang="en-US" sz="1100" dirty="0"/>
+                        <a:t>기준 오름차순 정렬</a:t>
                       </a:r>
                     </a:p>
                   </a:txBody>
-                  <a:tcPr marL="76200" marR="76200" anchor="ctr">
+                  <a:tcPr anchor="ctr">
                     <a:lnL w="9525" cap="flat" cmpd="sng" algn="ctr">
                       <a:solidFill>
                         <a:schemeClr val="bg1">
@@ -13091,7 +13132,7 @@
                     <a:p>
                       <a:pPr fontAlgn="base" latinLnBrk="0"/>
                       <a:r>
-                        <a:rPr lang="ko-KR" altLang="en-US" sz="1100">
+                        <a:rPr lang="ko-KR" altLang="en-US" sz="1100" dirty="0">
                           <a:effectLst/>
                         </a:rPr>
                         <a:t>부서추가</a:t>
@@ -13159,34 +13200,131 @@
                     <a:bodyPr/>
                     <a:lstStyle/>
                     <a:p>
-                      <a:pPr fontAlgn="base" latinLnBrk="0"/>
-                      <a:r>
-                        <a:rPr lang="ko-KR" altLang="en-US" sz="1100" dirty="0">
-                          <a:effectLst/>
-                        </a:rPr>
-                        <a:t>부서코드 중복 검증 후 </a:t>
-                      </a:r>
-                      <a:r>
-                        <a:rPr lang="en-US" altLang="ko-KR" sz="1100" dirty="0">
-                          <a:effectLst/>
-                        </a:rPr>
-                        <a:t>ORGDEPTMASTER </a:t>
-                      </a:r>
-                      <a:r>
-                        <a:rPr lang="ko-KR" altLang="en-US" sz="1100" dirty="0">
-                          <a:effectLst/>
-                        </a:rPr>
-                        <a:t>테이블 </a:t>
-                      </a:r>
-                      <a:r>
-                        <a:rPr lang="en-US" altLang="ko-KR" sz="1100" dirty="0">
-                          <a:effectLst/>
-                        </a:rPr>
+                      <a:r>
+                        <a:rPr lang="ko-KR" altLang="en-US" sz="1100" dirty="0"/>
+                        <a:t>입력된 부서코드가 기존에 존재하는지 확인 </a:t>
+                      </a:r>
+                      <a:r>
+                        <a:rPr lang="en-US" altLang="ko-KR" sz="1100" dirty="0"/>
+                        <a:t>(</a:t>
+                      </a:r>
+                      <a:r>
+                        <a:rPr lang="en-US" altLang="ko-KR" sz="1100" dirty="0" err="1"/>
+                        <a:t>countByDeptCode</a:t>
+                      </a:r>
+                      <a:r>
+                        <a:rPr lang="en-US" altLang="ko-KR" sz="1100" dirty="0"/>
+                        <a:t>). </a:t>
+                      </a:r>
+                      <a:r>
+                        <a:rPr lang="ko-KR" altLang="en-US" sz="1100" dirty="0"/>
+                        <a:t>이미 존재하는 경우 중복 코드</a:t>
+                      </a:r>
+                      <a:r>
+                        <a:rPr lang="en-US" altLang="ko-KR" sz="1100" dirty="0"/>
+                        <a:t> </a:t>
+                      </a:r>
+                      <a:r>
+                        <a:rPr lang="ko-KR" altLang="en-US" sz="1100" dirty="0"/>
+                        <a:t>예외 발생 → 사용자에게 오류 메시지 출력 후 등록 중단</a:t>
+                      </a:r>
+                      <a:r>
+                        <a:rPr lang="en-US" altLang="ko-KR" sz="1100" dirty="0"/>
+                        <a:t>. </a:t>
+                      </a:r>
+                      <a:r>
+                        <a:rPr lang="ko-KR" altLang="en-US" sz="1100" dirty="0"/>
+                        <a:t>유효성 정제 후 </a:t>
+                      </a:r>
+                      <a:r>
+                        <a:rPr lang="en-US" altLang="ko-KR" sz="1100" dirty="0"/>
+                        <a:t>ORGDEPTMASTER</a:t>
+                      </a:r>
+                      <a:r>
+                        <a:rPr lang="ko-KR" altLang="en-US" sz="1100" dirty="0"/>
+                        <a:t>에 </a:t>
+                      </a:r>
+                      <a:r>
+                        <a:rPr lang="en-US" altLang="ko-KR" sz="1100" dirty="0"/>
                         <a:t>INSERT</a:t>
                       </a:r>
+                    </a:p>
+                    <a:p>
+                      <a:endParaRPr lang="en-US" altLang="ko-KR" sz="1100" dirty="0"/>
+                    </a:p>
+                    <a:p>
+                      <a:r>
+                        <a:rPr lang="ko-KR" altLang="en-US" sz="1100" dirty="0"/>
+                        <a:t>포함 데이터</a:t>
+                      </a:r>
+                      <a:r>
+                        <a:rPr lang="en-US" altLang="ko-KR" sz="1100" dirty="0"/>
+                        <a:t>: </a:t>
+                      </a:r>
+                      <a:r>
+                        <a:rPr lang="ko-KR" altLang="en-US" sz="1100" dirty="0"/>
+                        <a:t>부서코드</a:t>
+                      </a:r>
+                      <a:r>
+                        <a:rPr lang="en-US" altLang="ko-KR" sz="1100" dirty="0"/>
+                        <a:t>, </a:t>
+                      </a:r>
+                      <a:r>
+                        <a:rPr lang="ko-KR" altLang="en-US" sz="1100" dirty="0"/>
+                        <a:t>부서명</a:t>
+                      </a:r>
+                      <a:r>
+                        <a:rPr lang="en-US" altLang="ko-KR" sz="1100" dirty="0"/>
+                        <a:t>, </a:t>
+                      </a:r>
+                      <a:r>
+                        <a:rPr lang="ko-KR" altLang="en-US" sz="1100" dirty="0"/>
+                        <a:t>부서구분</a:t>
+                      </a:r>
+                      <a:r>
+                        <a:rPr lang="en-US" altLang="ko-KR" sz="1100" dirty="0"/>
+                        <a:t>, </a:t>
+                      </a:r>
+                      <a:r>
+                        <a:rPr lang="ko-KR" altLang="en-US" sz="1100" dirty="0"/>
+                        <a:t>상위부서</a:t>
+                      </a:r>
+                      <a:r>
+                        <a:rPr lang="en-US" altLang="ko-KR" sz="1100" dirty="0"/>
+                        <a:t>, </a:t>
+                      </a:r>
+                      <a:r>
+                        <a:rPr lang="ko-KR" altLang="en-US" sz="1100" dirty="0"/>
+                        <a:t>시작</a:t>
+                      </a:r>
+                      <a:r>
+                        <a:rPr lang="en-US" altLang="ko-KR" sz="1100" dirty="0"/>
+                        <a:t>/</a:t>
+                      </a:r>
+                      <a:r>
+                        <a:rPr lang="ko-KR" altLang="en-US" sz="1100" dirty="0"/>
+                        <a:t>종료일</a:t>
+                      </a:r>
+                      <a:r>
+                        <a:rPr lang="en-US" altLang="ko-KR" sz="1100" dirty="0"/>
+                        <a:t>, </a:t>
+                      </a:r>
+                      <a:r>
+                        <a:rPr lang="ko-KR" altLang="en-US" sz="1100" dirty="0"/>
+                        <a:t>사용여부</a:t>
+                      </a:r>
+                      <a:r>
+                        <a:rPr lang="en-US" altLang="ko-KR" sz="1100" dirty="0"/>
+                        <a:t>, </a:t>
+                      </a:r>
+                      <a:r>
+                        <a:rPr lang="ko-KR" altLang="en-US" sz="1100" dirty="0"/>
+                        <a:t>근무패턴</a:t>
+                      </a:r>
+                      <a:endParaRPr lang="en-US" altLang="ko-KR" sz="1100" dirty="0"/>
                     </a:p>
                   </a:txBody>
-                  <a:tcPr marL="76200" marR="76200" anchor="ctr">
+                  <a:tcPr anchor="ctr">
                     <a:lnL w="9525" cap="flat" cmpd="sng" algn="ctr">
                       <a:solidFill>
                         <a:schemeClr val="bg1">
@@ -13347,7 +13485,7 @@
                     <a:p>
                       <a:pPr fontAlgn="base" latinLnBrk="0"/>
                       <a:r>
-                        <a:rPr lang="ko-KR" altLang="en-US" sz="1100">
+                        <a:rPr lang="ko-KR" altLang="en-US" sz="1100" dirty="0">
                           <a:effectLst/>
                         </a:rPr>
                         <a:t>부서정보수정</a:t>
@@ -13417,41 +13555,57 @@
                     <a:p>
                       <a:pPr fontAlgn="base" latinLnBrk="0"/>
                       <a:r>
-                        <a:rPr lang="ko-KR" altLang="en-US" sz="1100" dirty="0">
-                          <a:effectLst/>
-                        </a:rPr>
-                        <a:t>부서코드 변경 시 중복 검사</a:t>
-                      </a:r>
-                      <a:r>
-                        <a:rPr lang="en-US" altLang="ko-KR" sz="1100" dirty="0">
-                          <a:effectLst/>
-                        </a:rPr>
+                        <a:rPr lang="ko-KR" altLang="en-US" sz="1100" dirty="0"/>
+                        <a:t>수정 시 기존 부서코드와 변경된 부서코드가 다를 경우</a:t>
+                      </a:r>
+                      <a:r>
+                        <a:rPr lang="en-US" altLang="ko-KR" sz="1100" dirty="0"/>
                         <a:t>, </a:t>
                       </a:r>
                       <a:r>
-                        <a:rPr lang="ko-KR" altLang="en-US" sz="1100" dirty="0">
-                          <a:effectLst/>
-                        </a:rPr>
-                        <a:t>날짜 필드 </a:t>
-                      </a:r>
-                      <a:r>
-                        <a:rPr lang="en-US" altLang="ko-KR" sz="1100" dirty="0">
-                          <a:effectLst/>
-                        </a:rPr>
-                        <a:t>YYYYMMDD </a:t>
-                      </a:r>
-                      <a:r>
-                        <a:rPr lang="ko-KR" altLang="en-US" sz="1100" dirty="0">
-                          <a:effectLst/>
-                        </a:rPr>
-                        <a:t>형식 변환 후 </a:t>
-                      </a:r>
-                      <a:r>
-                        <a:rPr lang="en-US" altLang="ko-KR" sz="1100" dirty="0">
-                          <a:effectLst/>
-                        </a:rPr>
-                        <a:t>UPDATE</a:t>
-                      </a:r>
+                        <a:rPr lang="ko-KR" altLang="en-US" sz="1100" dirty="0"/>
+                        <a:t>중복 여부 체크</a:t>
+                      </a:r>
+                      <a:r>
+                        <a:rPr lang="en-US" altLang="ko-KR" sz="1100" dirty="0"/>
+                        <a:t>. </a:t>
+                      </a:r>
+                      <a:r>
+                        <a:rPr lang="ko-KR" altLang="en-US" sz="1100" dirty="0"/>
+                        <a:t>시작일</a:t>
+                      </a:r>
+                      <a:r>
+                        <a:rPr lang="en-US" altLang="ko-KR" sz="1100" dirty="0"/>
+                        <a:t>/</a:t>
+                      </a:r>
+                      <a:r>
+                        <a:rPr lang="ko-KR" altLang="en-US" sz="1100" dirty="0"/>
+                        <a:t>종료일 기본값 처리</a:t>
+                      </a:r>
+                      <a:br>
+                        <a:rPr lang="en-US" altLang="ko-KR" sz="1100" dirty="0"/>
+                      </a:br>
+                      <a:endParaRPr lang="en-US" altLang="ko-KR" sz="1100" dirty="0"/>
+                    </a:p>
+                    <a:p>
+                      <a:pPr fontAlgn="base" latinLnBrk="0"/>
+                      <a:r>
+                        <a:rPr lang="en-US" altLang="ko-KR" sz="1100" dirty="0"/>
+                        <a:t>ORGDEPTMASTER </a:t>
+                      </a:r>
+                      <a:r>
+                        <a:rPr lang="ko-KR" altLang="en-US" sz="1100" dirty="0"/>
+                        <a:t>테이블에 </a:t>
+                      </a:r>
+                      <a:r>
+                        <a:rPr lang="en-US" altLang="ko-KR" sz="1100" dirty="0"/>
+                        <a:t>UPDATE </a:t>
+                      </a:r>
+                      <a:r>
+                        <a:rPr lang="ko-KR" altLang="en-US" sz="1100" dirty="0"/>
+                        <a:t>수행</a:t>
+                      </a:r>
+                      <a:endParaRPr lang="en-US" altLang="ko-KR" sz="1100" dirty="0"/>
                     </a:p>
                   </a:txBody>
                   <a:tcPr marL="76200" marR="76200" anchor="ctr">
@@ -13683,40 +13837,30 @@
                     <a:bodyPr/>
                     <a:lstStyle/>
                     <a:p>
-                      <a:pPr fontAlgn="base" latinLnBrk="0"/>
-                      <a:r>
-                        <a:rPr lang="en-US" altLang="ko-KR" sz="1100" dirty="0">
-                          <a:effectLst/>
-                        </a:rPr>
-                        <a:t>DEPT_CODE </a:t>
-                      </a:r>
-                      <a:r>
-                        <a:rPr lang="ko-KR" altLang="en-US" sz="1100" dirty="0">
-                          <a:effectLst/>
-                        </a:rPr>
-                        <a:t>기준 </a:t>
-                      </a:r>
-                      <a:r>
-                        <a:rPr lang="en-US" altLang="ko-KR" sz="1100" dirty="0">
-                          <a:effectLst/>
-                        </a:rPr>
-                        <a:t>ORGDEPTMASTER </a:t>
-                      </a:r>
-                      <a:r>
-                        <a:rPr lang="ko-KR" altLang="en-US" sz="1100" dirty="0">
-                          <a:effectLst/>
-                        </a:rPr>
-                        <a:t>테이블 </a:t>
-                      </a:r>
-                      <a:r>
-                        <a:rPr lang="en-US" altLang="ko-KR" sz="1100" dirty="0">
-                          <a:effectLst/>
-                        </a:rPr>
+                      <a:r>
+                        <a:rPr lang="en-US" altLang="ko-KR" sz="1100" dirty="0"/>
+                        <a:t>ORGDEPTMASTER</a:t>
+                      </a:r>
+                      <a:r>
+                        <a:rPr lang="ko-KR" altLang="en-US" sz="1100" dirty="0"/>
+                        <a:t>에서 부서코드를 기준으로 </a:t>
+                      </a:r>
+                      <a:r>
+                        <a:rPr lang="en-US" altLang="ko-KR" sz="1100" dirty="0"/>
                         <a:t>DELETE</a:t>
+                      </a:r>
+                    </a:p>
+                    <a:p>
+                      <a:endParaRPr lang="en-US" altLang="ko-KR" sz="1100" dirty="0"/>
+                    </a:p>
+                    <a:p>
+                      <a:r>
+                        <a:rPr lang="ko-KR" altLang="en-US" sz="1100" dirty="0"/>
+                        <a:t>해당 부서에 소속된 인원이 존재할 경우 예외 발생 → 삭제 중단</a:t>
                       </a:r>
                     </a:p>
                   </a:txBody>
-                  <a:tcPr marL="76200" marR="76200" anchor="ctr">
+                  <a:tcPr anchor="ctr">
                     <a:lnL w="9525" cap="flat" cmpd="sng" algn="ctr">
                       <a:solidFill>
                         <a:schemeClr val="bg1">
@@ -13945,40 +14089,76 @@
                     <a:bodyPr/>
                     <a:lstStyle/>
                     <a:p>
-                      <a:pPr fontAlgn="base" latinLnBrk="0"/>
-                      <a:r>
-                        <a:rPr lang="en-US" altLang="ko-KR" sz="1100" dirty="0">
-                          <a:effectLst/>
-                        </a:rPr>
-                        <a:t>HRIMASTER </a:t>
-                      </a:r>
-                      <a:r>
-                        <a:rPr lang="ko-KR" altLang="en-US" sz="1100" dirty="0">
-                          <a:effectLst/>
-                        </a:rPr>
-                        <a:t>테이블 </a:t>
-                      </a:r>
-                      <a:r>
-                        <a:rPr lang="en-US" altLang="ko-KR" sz="1100" dirty="0">
-                          <a:effectLst/>
-                        </a:rPr>
-                        <a:t>DEPT_CODE </a:t>
-                      </a:r>
-                      <a:r>
-                        <a:rPr lang="ko-KR" altLang="en-US" sz="1100" dirty="0">
-                          <a:effectLst/>
-                        </a:rPr>
-                        <a:t>필드 </a:t>
-                      </a:r>
-                      <a:r>
-                        <a:rPr lang="en-US" altLang="ko-KR" sz="1100" dirty="0">
-                          <a:effectLst/>
-                        </a:rPr>
-                        <a:t>UPDATE</a:t>
+                      <a:r>
+                        <a:rPr lang="ko-KR" altLang="en-US" sz="1100" dirty="0"/>
+                        <a:t>사원 배정</a:t>
+                      </a:r>
+                      <a:r>
+                        <a:rPr lang="en-US" altLang="ko-KR" sz="1100" dirty="0"/>
+                        <a:t>: HRIMASTER.DEPT_CODE</a:t>
+                      </a:r>
+                      <a:r>
+                        <a:rPr lang="ko-KR" altLang="en-US" sz="1100" dirty="0"/>
+                        <a:t>에 부서코드 업데이트</a:t>
+                      </a:r>
+                      <a:br>
+                        <a:rPr lang="ko-KR" altLang="en-US" sz="1100" dirty="0"/>
+                      </a:br>
+                      <a:r>
+                        <a:rPr lang="ko-KR" altLang="en-US" sz="1100" dirty="0"/>
+                        <a:t>사원 제거</a:t>
+                      </a:r>
+                      <a:r>
+                        <a:rPr lang="en-US" altLang="ko-KR" sz="1100" dirty="0"/>
+                        <a:t>: </a:t>
+                      </a:r>
+                      <a:r>
+                        <a:rPr lang="ko-KR" altLang="en-US" sz="1100" dirty="0"/>
+                        <a:t>부서코드를 </a:t>
+                      </a:r>
+                      <a:r>
+                        <a:rPr lang="en-US" altLang="ko-KR" sz="1100" dirty="0"/>
+                        <a:t>NULL</a:t>
+                      </a:r>
+                      <a:r>
+                        <a:rPr lang="ko-KR" altLang="en-US" sz="1100" dirty="0"/>
+                        <a:t>로 처리</a:t>
+                      </a:r>
+                      <a:r>
+                        <a:rPr lang="en-US" altLang="ko-KR" sz="1100" dirty="0"/>
+                        <a:t>, </a:t>
+                      </a:r>
+                      <a:r>
+                        <a:rPr lang="ko-KR" altLang="en-US" sz="1100" dirty="0"/>
+                        <a:t>부서장을 제거하는 경우 권한</a:t>
+                      </a:r>
+                      <a:r>
+                        <a:rPr lang="en-US" altLang="ko-KR" sz="1100" dirty="0"/>
+                        <a:t>(IS_HEADER) 'N'</a:t>
+                      </a:r>
+                      <a:r>
+                        <a:rPr lang="ko-KR" altLang="en-US" sz="1100" dirty="0"/>
+                        <a:t>으로 변경하고 </a:t>
+                      </a:r>
+                      <a:r>
+                        <a:rPr lang="en-US" altLang="ko-KR" sz="1100" dirty="0"/>
+                        <a:t>ORGDEPTMASTER.DEPT_LEADER</a:t>
+                      </a:r>
+                      <a:r>
+                        <a:rPr lang="ko-KR" altLang="en-US" sz="1100" dirty="0"/>
+                        <a:t>도 </a:t>
+                      </a:r>
+                      <a:r>
+                        <a:rPr lang="en-US" altLang="ko-KR" sz="1100" dirty="0"/>
+                        <a:t>NULL </a:t>
+                      </a:r>
+                      <a:r>
+                        <a:rPr lang="ko-KR" altLang="en-US" sz="1100" dirty="0"/>
+                        <a:t>처리</a:t>
                       </a:r>
                     </a:p>
                   </a:txBody>
-                  <a:tcPr marL="76200" marR="76200" anchor="ctr">
+                  <a:tcPr anchor="ctr">
                     <a:lnL w="9525" cap="flat" cmpd="sng" algn="ctr">
                       <a:solidFill>
                         <a:schemeClr val="bg1">
@@ -14138,11 +14318,14 @@
                     <a:p>
                       <a:pPr fontAlgn="base" latinLnBrk="0"/>
                       <a:r>
-                        <a:rPr lang="ko-KR" altLang="en-US" sz="1100" dirty="0">
+                        <a:rPr lang="ko-KR" altLang="en-US" sz="1100">
                           <a:effectLst/>
                         </a:rPr>
                         <a:t>부서장설정</a:t>
                       </a:r>
+                      <a:endParaRPr lang="ko-KR" altLang="en-US" sz="1100" dirty="0">
+                        <a:effectLst/>
+                      </a:endParaRPr>
                     </a:p>
                   </a:txBody>
                   <a:tcPr marL="76200" marR="76200" anchor="ctr">
@@ -14206,28 +14389,63 @@
                     <a:bodyPr/>
                     <a:lstStyle/>
                     <a:p>
-                      <a:pPr fontAlgn="base" latinLnBrk="0"/>
-                      <a:r>
-                        <a:rPr lang="en-US" sz="1100" dirty="0">
-                          <a:effectLst/>
-                        </a:rPr>
-                        <a:t>HRIMASTER(IS_HEADER) + ORGDEPTMASTER(DEPT_LEADER) </a:t>
-                      </a:r>
-                      <a:r>
-                        <a:rPr lang="ko-KR" altLang="en-US" sz="1100" dirty="0">
-                          <a:effectLst/>
-                        </a:rPr>
-                        <a:t>동시 </a:t>
-                      </a:r>
-                      <a:r>
-                        <a:rPr lang="en-US" sz="1100" dirty="0">
-                          <a:effectLst/>
-                        </a:rPr>
-                        <a:t>UPDATE</a:t>
+                      <a:r>
+                        <a:rPr lang="ko-KR" altLang="en-US" sz="1100" dirty="0"/>
+                        <a:t>선택한 사원을 </a:t>
+                      </a:r>
+                      <a:r>
+                        <a:rPr lang="en-US" altLang="ko-KR" sz="1100" dirty="0"/>
+                        <a:t>ORGDEPTMASTER.DEPT_LEADER</a:t>
+                      </a:r>
+                      <a:r>
+                        <a:rPr lang="ko-KR" altLang="en-US" sz="1100" dirty="0"/>
+                        <a:t>로 설정하고</a:t>
+                      </a:r>
+                      <a:r>
+                        <a:rPr lang="en-US" altLang="ko-KR" sz="1100" dirty="0"/>
+                        <a:t>, HRIMASTER.IS_HEADER</a:t>
+                      </a:r>
+                      <a:r>
+                        <a:rPr lang="ko-KR" altLang="en-US" sz="1100" dirty="0"/>
+                        <a:t>를 </a:t>
+                      </a:r>
+                      <a:r>
+                        <a:rPr lang="en-US" altLang="ko-KR" sz="1100" dirty="0"/>
+                        <a:t>'Y'</a:t>
+                      </a:r>
+                      <a:r>
+                        <a:rPr lang="ko-KR" altLang="en-US" sz="1100" dirty="0"/>
+                        <a:t>로 업데이트</a:t>
+                      </a:r>
+                      <a:endParaRPr lang="en-US" altLang="ko-KR" sz="1100" dirty="0"/>
+                    </a:p>
+                    <a:p>
+                      <a:endParaRPr lang="en-US" altLang="ko-KR" sz="1100" dirty="0"/>
+                    </a:p>
+                    <a:p>
+                      <a:r>
+                        <a:rPr lang="ko-KR" altLang="en-US" sz="1100" dirty="0"/>
+                        <a:t>기존 부서장이 존재할 경우 해당 인원의 </a:t>
+                      </a:r>
+                      <a:r>
+                        <a:rPr lang="en-US" altLang="ko-KR" sz="1100" dirty="0"/>
+                        <a:t>IS_HEADER</a:t>
+                      </a:r>
+                      <a:r>
+                        <a:rPr lang="ko-KR" altLang="en-US" sz="1100" dirty="0"/>
+                        <a:t>를 </a:t>
+                      </a:r>
+                      <a:r>
+                        <a:rPr lang="en-US" altLang="ko-KR" sz="1100" dirty="0"/>
+                        <a:t>'N'</a:t>
+                      </a:r>
+                      <a:r>
+                        <a:rPr lang="ko-KR" altLang="en-US" sz="1100" dirty="0"/>
+                        <a:t>으로 변경 후 새로운 부서장으로 교체 처리</a:t>
                       </a:r>
                     </a:p>
                   </a:txBody>
-                  <a:tcPr marL="76200" marR="76200" anchor="ctr">
+                  <a:tcPr anchor="ctr">
                     <a:lnL w="9525" cap="flat" cmpd="sng" algn="ctr">
                       <a:solidFill>
                         <a:schemeClr val="bg1">

</xml_diff>